<commit_message>
Added the test case 6 reverse engineer.
</commit_message>
<xml_diff>
--- a/doc/diagrams.pptx
+++ b/doc/diagrams.pptx
@@ -104,6 +104,11 @@
       </a:defRPr>
     </a:lvl9pPr>
   </p:defaultTextStyle>
+  <p:extLst>
+    <p:ext uri="{EFAFB233-063F-42B5-8137-9DF3F51BA10A}">
+      <p15:sldGuideLst xmlns:p15="http://schemas.microsoft.com/office/powerpoint/2012/main"/>
+    </p:ext>
+  </p:extLst>
 </p:presentation>
 </file>
 
@@ -256,7 +261,7 @@
           <a:p>
             <a:fld id="{1D68CFA8-18F2-4D3D-BE66-5F7A36BCDAEE}" type="datetimeFigureOut">
               <a:rPr lang="en-SG" smtClean="0"/>
-              <a:t>30/6/2023</a:t>
+              <a:t>18/7/2023</a:t>
             </a:fld>
             <a:endParaRPr lang="en-SG"/>
           </a:p>
@@ -456,7 +461,7 @@
           <a:p>
             <a:fld id="{1D68CFA8-18F2-4D3D-BE66-5F7A36BCDAEE}" type="datetimeFigureOut">
               <a:rPr lang="en-SG" smtClean="0"/>
-              <a:t>30/6/2023</a:t>
+              <a:t>18/7/2023</a:t>
             </a:fld>
             <a:endParaRPr lang="en-SG"/>
           </a:p>
@@ -666,7 +671,7 @@
           <a:p>
             <a:fld id="{1D68CFA8-18F2-4D3D-BE66-5F7A36BCDAEE}" type="datetimeFigureOut">
               <a:rPr lang="en-SG" smtClean="0"/>
-              <a:t>30/6/2023</a:t>
+              <a:t>18/7/2023</a:t>
             </a:fld>
             <a:endParaRPr lang="en-SG"/>
           </a:p>
@@ -866,7 +871,7 @@
           <a:p>
             <a:fld id="{1D68CFA8-18F2-4D3D-BE66-5F7A36BCDAEE}" type="datetimeFigureOut">
               <a:rPr lang="en-SG" smtClean="0"/>
-              <a:t>30/6/2023</a:t>
+              <a:t>18/7/2023</a:t>
             </a:fld>
             <a:endParaRPr lang="en-SG"/>
           </a:p>
@@ -1142,7 +1147,7 @@
           <a:p>
             <a:fld id="{1D68CFA8-18F2-4D3D-BE66-5F7A36BCDAEE}" type="datetimeFigureOut">
               <a:rPr lang="en-SG" smtClean="0"/>
-              <a:t>30/6/2023</a:t>
+              <a:t>18/7/2023</a:t>
             </a:fld>
             <a:endParaRPr lang="en-SG"/>
           </a:p>
@@ -1410,7 +1415,7 @@
           <a:p>
             <a:fld id="{1D68CFA8-18F2-4D3D-BE66-5F7A36BCDAEE}" type="datetimeFigureOut">
               <a:rPr lang="en-SG" smtClean="0"/>
-              <a:t>30/6/2023</a:t>
+              <a:t>18/7/2023</a:t>
             </a:fld>
             <a:endParaRPr lang="en-SG"/>
           </a:p>
@@ -1825,7 +1830,7 @@
           <a:p>
             <a:fld id="{1D68CFA8-18F2-4D3D-BE66-5F7A36BCDAEE}" type="datetimeFigureOut">
               <a:rPr lang="en-SG" smtClean="0"/>
-              <a:t>30/6/2023</a:t>
+              <a:t>18/7/2023</a:t>
             </a:fld>
             <a:endParaRPr lang="en-SG"/>
           </a:p>
@@ -1967,7 +1972,7 @@
           <a:p>
             <a:fld id="{1D68CFA8-18F2-4D3D-BE66-5F7A36BCDAEE}" type="datetimeFigureOut">
               <a:rPr lang="en-SG" smtClean="0"/>
-              <a:t>30/6/2023</a:t>
+              <a:t>18/7/2023</a:t>
             </a:fld>
             <a:endParaRPr lang="en-SG"/>
           </a:p>
@@ -2080,7 +2085,7 @@
           <a:p>
             <a:fld id="{1D68CFA8-18F2-4D3D-BE66-5F7A36BCDAEE}" type="datetimeFigureOut">
               <a:rPr lang="en-SG" smtClean="0"/>
-              <a:t>30/6/2023</a:t>
+              <a:t>18/7/2023</a:t>
             </a:fld>
             <a:endParaRPr lang="en-SG"/>
           </a:p>
@@ -2393,7 +2398,7 @@
           <a:p>
             <a:fld id="{1D68CFA8-18F2-4D3D-BE66-5F7A36BCDAEE}" type="datetimeFigureOut">
               <a:rPr lang="en-SG" smtClean="0"/>
-              <a:t>30/6/2023</a:t>
+              <a:t>18/7/2023</a:t>
             </a:fld>
             <a:endParaRPr lang="en-SG"/>
           </a:p>
@@ -2682,7 +2687,7 @@
           <a:p>
             <a:fld id="{1D68CFA8-18F2-4D3D-BE66-5F7A36BCDAEE}" type="datetimeFigureOut">
               <a:rPr lang="en-SG" smtClean="0"/>
-              <a:t>30/6/2023</a:t>
+              <a:t>18/7/2023</a:t>
             </a:fld>
             <a:endParaRPr lang="en-SG"/>
           </a:p>
@@ -2925,7 +2930,7 @@
           <a:p>
             <a:fld id="{1D68CFA8-18F2-4D3D-BE66-5F7A36BCDAEE}" type="datetimeFigureOut">
               <a:rPr lang="en-SG" smtClean="0"/>
-              <a:t>30/6/2023</a:t>
+              <a:t>18/7/2023</a:t>
             </a:fld>
             <a:endParaRPr lang="en-SG"/>
           </a:p>
@@ -3356,7 +3361,7 @@
         </p:nvSpPr>
         <p:spPr>
           <a:xfrm>
-            <a:off x="1625258" y="2149982"/>
+            <a:off x="1537123" y="772873"/>
             <a:ext cx="1931758" cy="593217"/>
           </a:xfrm>
           <a:prstGeom prst="roundRect">
@@ -3408,7 +3413,7 @@
         </p:nvCxnSpPr>
         <p:spPr>
           <a:xfrm>
-            <a:off x="3557016" y="2446591"/>
+            <a:off x="3468881" y="1069482"/>
             <a:ext cx="466344" cy="0"/>
           </a:xfrm>
           <a:prstGeom prst="straightConnector1">
@@ -3447,7 +3452,7 @@
         </p:nvSpPr>
         <p:spPr>
           <a:xfrm>
-            <a:off x="4023360" y="2148076"/>
+            <a:off x="3935225" y="770967"/>
             <a:ext cx="1931758" cy="593217"/>
           </a:xfrm>
           <a:prstGeom prst="roundRect">
@@ -3498,7 +3503,7 @@
         </p:nvCxnSpPr>
         <p:spPr>
           <a:xfrm>
-            <a:off x="5955118" y="2444683"/>
+            <a:off x="5866983" y="1067574"/>
             <a:ext cx="466344" cy="0"/>
           </a:xfrm>
           <a:prstGeom prst="straightConnector1">
@@ -3537,7 +3542,7 @@
         </p:nvSpPr>
         <p:spPr>
           <a:xfrm>
-            <a:off x="6421462" y="2148075"/>
+            <a:off x="6333327" y="770966"/>
             <a:ext cx="1931758" cy="593217"/>
           </a:xfrm>
           <a:prstGeom prst="roundRect">
@@ -3573,6 +3578,552 @@
               <a:t>cmd</a:t>
             </a:r>
             <a:endParaRPr lang="en-SG" sz="1200" b="1" dirty="0"/>
+          </a:p>
+        </p:txBody>
+      </p:sp>
+      <p:sp>
+        <p:nvSpPr>
+          <p:cNvPr id="2" name="Rectangle: Rounded Corners 1">
+            <a:extLst>
+              <a:ext uri="{FF2B5EF4-FFF2-40B4-BE49-F238E27FC236}">
+                <a16:creationId xmlns:a16="http://schemas.microsoft.com/office/drawing/2014/main" id="{76B3239E-513D-7E8A-CBAD-442EDE69C49B}"/>
+              </a:ext>
+            </a:extLst>
+          </p:cNvPr>
+          <p:cNvSpPr/>
+          <p:nvPr/>
+        </p:nvSpPr>
+        <p:spPr>
+          <a:xfrm>
+            <a:off x="1050546" y="3429000"/>
+            <a:ext cx="1802823" cy="593217"/>
+          </a:xfrm>
+          <a:prstGeom prst="roundRect">
+            <a:avLst/>
+          </a:prstGeom>
+        </p:spPr>
+        <p:style>
+          <a:lnRef idx="2">
+            <a:schemeClr val="accent1">
+              <a:shade val="50000"/>
+            </a:schemeClr>
+          </a:lnRef>
+          <a:fillRef idx="1">
+            <a:schemeClr val="accent1"/>
+          </a:fillRef>
+          <a:effectRef idx="0">
+            <a:schemeClr val="accent1"/>
+          </a:effectRef>
+          <a:fontRef idx="minor">
+            <a:schemeClr val="lt1"/>
+          </a:fontRef>
+        </p:style>
+        <p:txBody>
+          <a:bodyPr rtlCol="0" anchor="ctr"/>
+          <a:lstStyle/>
+          <a:p>
+            <a:r>
+              <a:rPr lang="en-SG" sz="1200" b="1" dirty="0"/>
+              <a:t>Download the binary file and try execute. </a:t>
+            </a:r>
+          </a:p>
+        </p:txBody>
+      </p:sp>
+      <p:cxnSp>
+        <p:nvCxnSpPr>
+          <p:cNvPr id="3" name="Straight Arrow Connector 2">
+            <a:extLst>
+              <a:ext uri="{FF2B5EF4-FFF2-40B4-BE49-F238E27FC236}">
+                <a16:creationId xmlns:a16="http://schemas.microsoft.com/office/drawing/2014/main" id="{40BA35A6-9F91-40FA-BF61-9938E8E071DC}"/>
+              </a:ext>
+            </a:extLst>
+          </p:cNvPr>
+          <p:cNvCxnSpPr>
+            <a:cxnSpLocks/>
+            <a:stCxn id="2" idx="3"/>
+            <a:endCxn id="7" idx="1"/>
+          </p:cNvCxnSpPr>
+          <p:nvPr/>
+        </p:nvCxnSpPr>
+        <p:spPr>
+          <a:xfrm flipV="1">
+            <a:off x="2853369" y="3359268"/>
+            <a:ext cx="729220" cy="366341"/>
+          </a:xfrm>
+          <a:prstGeom prst="straightConnector1">
+            <a:avLst/>
+          </a:prstGeom>
+          <a:ln w="28575">
+            <a:tailEnd type="triangle"/>
+          </a:ln>
+        </p:spPr>
+        <p:style>
+          <a:lnRef idx="1">
+            <a:schemeClr val="accent1"/>
+          </a:lnRef>
+          <a:fillRef idx="0">
+            <a:schemeClr val="accent1"/>
+          </a:fillRef>
+          <a:effectRef idx="0">
+            <a:schemeClr val="accent1"/>
+          </a:effectRef>
+          <a:fontRef idx="minor">
+            <a:schemeClr val="tx1"/>
+          </a:fontRef>
+        </p:style>
+      </p:cxnSp>
+      <p:sp>
+        <p:nvSpPr>
+          <p:cNvPr id="7" name="Rectangle: Rounded Corners 6">
+            <a:extLst>
+              <a:ext uri="{FF2B5EF4-FFF2-40B4-BE49-F238E27FC236}">
+                <a16:creationId xmlns:a16="http://schemas.microsoft.com/office/drawing/2014/main" id="{43115B42-490E-0272-8E8B-6FA431D7143A}"/>
+              </a:ext>
+            </a:extLst>
+          </p:cNvPr>
+          <p:cNvSpPr/>
+          <p:nvPr/>
+        </p:nvSpPr>
+        <p:spPr>
+          <a:xfrm>
+            <a:off x="3582589" y="3062659"/>
+            <a:ext cx="1802823" cy="593217"/>
+          </a:xfrm>
+          <a:prstGeom prst="roundRect">
+            <a:avLst/>
+          </a:prstGeom>
+        </p:spPr>
+        <p:style>
+          <a:lnRef idx="2">
+            <a:schemeClr val="accent1">
+              <a:shade val="50000"/>
+            </a:schemeClr>
+          </a:lnRef>
+          <a:fillRef idx="1">
+            <a:schemeClr val="accent1"/>
+          </a:fillRef>
+          <a:effectRef idx="0">
+            <a:schemeClr val="accent1"/>
+          </a:effectRef>
+          <a:fontRef idx="minor">
+            <a:schemeClr val="lt1"/>
+          </a:fontRef>
+        </p:style>
+        <p:txBody>
+          <a:bodyPr rtlCol="0" anchor="ctr"/>
+          <a:lstStyle/>
+          <a:p>
+            <a:r>
+              <a:rPr lang="en-SG" sz="1200" b="1" dirty="0"/>
+              <a:t>Try brute force attack the password </a:t>
+            </a:r>
+          </a:p>
+        </p:txBody>
+      </p:sp>
+      <p:cxnSp>
+        <p:nvCxnSpPr>
+          <p:cNvPr id="12" name="Straight Arrow Connector 11">
+            <a:extLst>
+              <a:ext uri="{FF2B5EF4-FFF2-40B4-BE49-F238E27FC236}">
+                <a16:creationId xmlns:a16="http://schemas.microsoft.com/office/drawing/2014/main" id="{1B894F88-ADEA-1EC9-43D6-FDABBDF5F1A9}"/>
+              </a:ext>
+            </a:extLst>
+          </p:cNvPr>
+          <p:cNvCxnSpPr>
+            <a:cxnSpLocks/>
+          </p:cNvCxnSpPr>
+          <p:nvPr/>
+        </p:nvCxnSpPr>
+        <p:spPr>
+          <a:xfrm>
+            <a:off x="2853369" y="3754876"/>
+            <a:ext cx="729220" cy="475601"/>
+          </a:xfrm>
+          <a:prstGeom prst="straightConnector1">
+            <a:avLst/>
+          </a:prstGeom>
+          <a:ln w="28575">
+            <a:tailEnd type="triangle"/>
+          </a:ln>
+        </p:spPr>
+        <p:style>
+          <a:lnRef idx="1">
+            <a:schemeClr val="accent1"/>
+          </a:lnRef>
+          <a:fillRef idx="0">
+            <a:schemeClr val="accent1"/>
+          </a:fillRef>
+          <a:effectRef idx="0">
+            <a:schemeClr val="accent1"/>
+          </a:effectRef>
+          <a:fontRef idx="minor">
+            <a:schemeClr val="tx1"/>
+          </a:fontRef>
+        </p:style>
+      </p:cxnSp>
+      <p:sp>
+        <p:nvSpPr>
+          <p:cNvPr id="17" name="Rectangle: Rounded Corners 16">
+            <a:extLst>
+              <a:ext uri="{FF2B5EF4-FFF2-40B4-BE49-F238E27FC236}">
+                <a16:creationId xmlns:a16="http://schemas.microsoft.com/office/drawing/2014/main" id="{38AD8810-731E-61EC-0924-1E4832DDE272}"/>
+              </a:ext>
+            </a:extLst>
+          </p:cNvPr>
+          <p:cNvSpPr/>
+          <p:nvPr/>
+        </p:nvSpPr>
+        <p:spPr>
+          <a:xfrm>
+            <a:off x="3582589" y="3963135"/>
+            <a:ext cx="1802823" cy="593217"/>
+          </a:xfrm>
+          <a:prstGeom prst="roundRect">
+            <a:avLst/>
+          </a:prstGeom>
+        </p:spPr>
+        <p:style>
+          <a:lnRef idx="2">
+            <a:schemeClr val="accent1">
+              <a:shade val="50000"/>
+            </a:schemeClr>
+          </a:lnRef>
+          <a:fillRef idx="1">
+            <a:schemeClr val="accent1"/>
+          </a:fillRef>
+          <a:effectRef idx="0">
+            <a:schemeClr val="accent1"/>
+          </a:effectRef>
+          <a:fontRef idx="minor">
+            <a:schemeClr val="lt1"/>
+          </a:fontRef>
+        </p:style>
+        <p:txBody>
+          <a:bodyPr rtlCol="0" anchor="ctr"/>
+          <a:lstStyle/>
+          <a:p>
+            <a:r>
+              <a:rPr lang="en-SG" sz="1200" b="1" dirty="0"/>
+              <a:t>Try reverse engineering tool to decompile the program</a:t>
+            </a:r>
+          </a:p>
+        </p:txBody>
+      </p:sp>
+      <p:cxnSp>
+        <p:nvCxnSpPr>
+          <p:cNvPr id="18" name="Straight Arrow Connector 17">
+            <a:extLst>
+              <a:ext uri="{FF2B5EF4-FFF2-40B4-BE49-F238E27FC236}">
+                <a16:creationId xmlns:a16="http://schemas.microsoft.com/office/drawing/2014/main" id="{576894CD-DE8A-0DF9-D480-2E67193BB63F}"/>
+              </a:ext>
+            </a:extLst>
+          </p:cNvPr>
+          <p:cNvCxnSpPr>
+            <a:cxnSpLocks/>
+          </p:cNvCxnSpPr>
+          <p:nvPr/>
+        </p:nvCxnSpPr>
+        <p:spPr>
+          <a:xfrm>
+            <a:off x="5366780" y="4244941"/>
+            <a:ext cx="500203" cy="0"/>
+          </a:xfrm>
+          <a:prstGeom prst="straightConnector1">
+            <a:avLst/>
+          </a:prstGeom>
+          <a:ln w="28575">
+            <a:tailEnd type="triangle"/>
+          </a:ln>
+        </p:spPr>
+        <p:style>
+          <a:lnRef idx="1">
+            <a:schemeClr val="accent1"/>
+          </a:lnRef>
+          <a:fillRef idx="0">
+            <a:schemeClr val="accent1"/>
+          </a:fillRef>
+          <a:effectRef idx="0">
+            <a:schemeClr val="accent1"/>
+          </a:effectRef>
+          <a:fontRef idx="minor">
+            <a:schemeClr val="tx1"/>
+          </a:fontRef>
+        </p:style>
+      </p:cxnSp>
+      <p:cxnSp>
+        <p:nvCxnSpPr>
+          <p:cNvPr id="21" name="Straight Arrow Connector 20">
+            <a:extLst>
+              <a:ext uri="{FF2B5EF4-FFF2-40B4-BE49-F238E27FC236}">
+                <a16:creationId xmlns:a16="http://schemas.microsoft.com/office/drawing/2014/main" id="{2661E722-106A-BE10-82A5-F4F8FE8F755B}"/>
+              </a:ext>
+            </a:extLst>
+          </p:cNvPr>
+          <p:cNvCxnSpPr>
+            <a:cxnSpLocks/>
+            <a:stCxn id="7" idx="2"/>
+            <a:endCxn id="17" idx="0"/>
+          </p:cNvCxnSpPr>
+          <p:nvPr/>
+        </p:nvCxnSpPr>
+        <p:spPr>
+          <a:xfrm>
+            <a:off x="4484001" y="3655876"/>
+            <a:ext cx="0" cy="307259"/>
+          </a:xfrm>
+          <a:prstGeom prst="straightConnector1">
+            <a:avLst/>
+          </a:prstGeom>
+          <a:ln w="28575">
+            <a:tailEnd type="triangle"/>
+          </a:ln>
+        </p:spPr>
+        <p:style>
+          <a:lnRef idx="1">
+            <a:schemeClr val="accent1"/>
+          </a:lnRef>
+          <a:fillRef idx="0">
+            <a:schemeClr val="accent1"/>
+          </a:fillRef>
+          <a:effectRef idx="0">
+            <a:schemeClr val="accent1"/>
+          </a:effectRef>
+          <a:fontRef idx="minor">
+            <a:schemeClr val="tx1"/>
+          </a:fontRef>
+        </p:style>
+      </p:cxnSp>
+      <p:sp>
+        <p:nvSpPr>
+          <p:cNvPr id="24" name="Rectangle: Rounded Corners 23">
+            <a:extLst>
+              <a:ext uri="{FF2B5EF4-FFF2-40B4-BE49-F238E27FC236}">
+                <a16:creationId xmlns:a16="http://schemas.microsoft.com/office/drawing/2014/main" id="{B4DEB919-D877-0463-FE4E-B23FBB97C951}"/>
+              </a:ext>
+            </a:extLst>
+          </p:cNvPr>
+          <p:cNvSpPr/>
+          <p:nvPr/>
+        </p:nvSpPr>
+        <p:spPr>
+          <a:xfrm>
+            <a:off x="5848352" y="3967705"/>
+            <a:ext cx="1510916" cy="593217"/>
+          </a:xfrm>
+          <a:prstGeom prst="roundRect">
+            <a:avLst/>
+          </a:prstGeom>
+        </p:spPr>
+        <p:style>
+          <a:lnRef idx="2">
+            <a:schemeClr val="accent1">
+              <a:shade val="50000"/>
+            </a:schemeClr>
+          </a:lnRef>
+          <a:fillRef idx="1">
+            <a:schemeClr val="accent1"/>
+          </a:fillRef>
+          <a:effectRef idx="0">
+            <a:schemeClr val="accent1"/>
+          </a:effectRef>
+          <a:fontRef idx="minor">
+            <a:schemeClr val="lt1"/>
+          </a:fontRef>
+        </p:style>
+        <p:txBody>
+          <a:bodyPr rtlCol="0" anchor="ctr"/>
+          <a:lstStyle/>
+          <a:p>
+            <a:r>
+              <a:rPr lang="en-SG" sz="1200" b="1" dirty="0"/>
+              <a:t>Analyse the de-compiled assembler code</a:t>
+            </a:r>
+          </a:p>
+        </p:txBody>
+      </p:sp>
+      <p:cxnSp>
+        <p:nvCxnSpPr>
+          <p:cNvPr id="27" name="Straight Arrow Connector 26">
+            <a:extLst>
+              <a:ext uri="{FF2B5EF4-FFF2-40B4-BE49-F238E27FC236}">
+                <a16:creationId xmlns:a16="http://schemas.microsoft.com/office/drawing/2014/main" id="{AAEACCCA-3F6D-3D59-AFD5-264CEDBAE7FD}"/>
+              </a:ext>
+            </a:extLst>
+          </p:cNvPr>
+          <p:cNvCxnSpPr>
+            <a:cxnSpLocks/>
+          </p:cNvCxnSpPr>
+          <p:nvPr/>
+        </p:nvCxnSpPr>
+        <p:spPr>
+          <a:xfrm>
+            <a:off x="7346143" y="4240371"/>
+            <a:ext cx="500203" cy="0"/>
+          </a:xfrm>
+          <a:prstGeom prst="straightConnector1">
+            <a:avLst/>
+          </a:prstGeom>
+          <a:ln w="28575">
+            <a:tailEnd type="triangle"/>
+          </a:ln>
+        </p:spPr>
+        <p:style>
+          <a:lnRef idx="1">
+            <a:schemeClr val="accent1"/>
+          </a:lnRef>
+          <a:fillRef idx="0">
+            <a:schemeClr val="accent1"/>
+          </a:fillRef>
+          <a:effectRef idx="0">
+            <a:schemeClr val="accent1"/>
+          </a:effectRef>
+          <a:fontRef idx="minor">
+            <a:schemeClr val="tx1"/>
+          </a:fontRef>
+        </p:style>
+      </p:cxnSp>
+      <p:sp>
+        <p:nvSpPr>
+          <p:cNvPr id="28" name="Rectangle: Rounded Corners 27">
+            <a:extLst>
+              <a:ext uri="{FF2B5EF4-FFF2-40B4-BE49-F238E27FC236}">
+                <a16:creationId xmlns:a16="http://schemas.microsoft.com/office/drawing/2014/main" id="{A5F68F71-64BA-D881-1720-16D7E4AA1532}"/>
+              </a:ext>
+            </a:extLst>
+          </p:cNvPr>
+          <p:cNvSpPr/>
+          <p:nvPr/>
+        </p:nvSpPr>
+        <p:spPr>
+          <a:xfrm>
+            <a:off x="7827714" y="3880854"/>
+            <a:ext cx="1802823" cy="719034"/>
+          </a:xfrm>
+          <a:prstGeom prst="roundRect">
+            <a:avLst/>
+          </a:prstGeom>
+        </p:spPr>
+        <p:style>
+          <a:lnRef idx="2">
+            <a:schemeClr val="accent1">
+              <a:shade val="50000"/>
+            </a:schemeClr>
+          </a:lnRef>
+          <a:fillRef idx="1">
+            <a:schemeClr val="accent1"/>
+          </a:fillRef>
+          <a:effectRef idx="0">
+            <a:schemeClr val="accent1"/>
+          </a:effectRef>
+          <a:fontRef idx="minor">
+            <a:schemeClr val="lt1"/>
+          </a:fontRef>
+        </p:style>
+        <p:txBody>
+          <a:bodyPr rtlCol="0" anchor="ctr"/>
+          <a:lstStyle/>
+          <a:p>
+            <a:r>
+              <a:rPr lang="en-SG" sz="1200" b="1" dirty="0"/>
+              <a:t>Find the parameters in </a:t>
+            </a:r>
+            <a:r>
+              <a:rPr lang="en-SG" sz="1200" b="1" dirty="0" err="1"/>
+              <a:t>check_password</a:t>
+            </a:r>
+            <a:r>
+              <a:rPr lang="en-SG" sz="1200" b="1" dirty="0"/>
+              <a:t>() function which assigned value</a:t>
+            </a:r>
+          </a:p>
+        </p:txBody>
+      </p:sp>
+      <p:cxnSp>
+        <p:nvCxnSpPr>
+          <p:cNvPr id="29" name="Straight Arrow Connector 28">
+            <a:extLst>
+              <a:ext uri="{FF2B5EF4-FFF2-40B4-BE49-F238E27FC236}">
+                <a16:creationId xmlns:a16="http://schemas.microsoft.com/office/drawing/2014/main" id="{1C60B8A2-BBC1-CFB3-895D-12A47C3C8FB0}"/>
+              </a:ext>
+            </a:extLst>
+          </p:cNvPr>
+          <p:cNvCxnSpPr>
+            <a:cxnSpLocks/>
+          </p:cNvCxnSpPr>
+          <p:nvPr/>
+        </p:nvCxnSpPr>
+        <p:spPr>
+          <a:xfrm>
+            <a:off x="9630537" y="4240371"/>
+            <a:ext cx="500203" cy="0"/>
+          </a:xfrm>
+          <a:prstGeom prst="straightConnector1">
+            <a:avLst/>
+          </a:prstGeom>
+          <a:ln w="28575">
+            <a:tailEnd type="triangle"/>
+          </a:ln>
+        </p:spPr>
+        <p:style>
+          <a:lnRef idx="1">
+            <a:schemeClr val="accent1"/>
+          </a:lnRef>
+          <a:fillRef idx="0">
+            <a:schemeClr val="accent1"/>
+          </a:fillRef>
+          <a:effectRef idx="0">
+            <a:schemeClr val="accent1"/>
+          </a:effectRef>
+          <a:fontRef idx="minor">
+            <a:schemeClr val="tx1"/>
+          </a:fontRef>
+        </p:style>
+      </p:cxnSp>
+      <p:sp>
+        <p:nvSpPr>
+          <p:cNvPr id="30" name="Rectangle: Rounded Corners 29">
+            <a:extLst>
+              <a:ext uri="{FF2B5EF4-FFF2-40B4-BE49-F238E27FC236}">
+                <a16:creationId xmlns:a16="http://schemas.microsoft.com/office/drawing/2014/main" id="{5C77E4F4-4DC7-DD4E-D580-FF35D7E0D452}"/>
+              </a:ext>
+            </a:extLst>
+          </p:cNvPr>
+          <p:cNvSpPr/>
+          <p:nvPr/>
+        </p:nvSpPr>
+        <p:spPr>
+          <a:xfrm>
+            <a:off x="10130740" y="3870898"/>
+            <a:ext cx="1802823" cy="719034"/>
+          </a:xfrm>
+          <a:prstGeom prst="roundRect">
+            <a:avLst/>
+          </a:prstGeom>
+        </p:spPr>
+        <p:style>
+          <a:lnRef idx="2">
+            <a:schemeClr val="accent1">
+              <a:shade val="50000"/>
+            </a:schemeClr>
+          </a:lnRef>
+          <a:fillRef idx="1">
+            <a:schemeClr val="accent1"/>
+          </a:fillRef>
+          <a:effectRef idx="0">
+            <a:schemeClr val="accent1"/>
+          </a:effectRef>
+          <a:fontRef idx="minor">
+            <a:schemeClr val="lt1"/>
+          </a:fontRef>
+        </p:style>
+        <p:txBody>
+          <a:bodyPr rtlCol="0" anchor="ctr"/>
+          <a:lstStyle/>
+          <a:p>
+            <a:r>
+              <a:rPr lang="en-SG" sz="1200" b="1" dirty="0"/>
+              <a:t>Decode the Hex to get all possible password strings and try one by one to get the flag</a:t>
+            </a:r>
           </a:p>
         </p:txBody>
       </p:sp>

</xml_diff>